<commit_message>
added -match to operators slide
</commit_message>
<xml_diff>
--- a/PowerShell for Padawans.pptx
+++ b/PowerShell for Padawans.pptx
@@ -245,14 +245,6 @@
     </p:ext>
   </p:extLst>
 </p:presentation>
-</file>
-
-<file path=ppt/revisionInfo.xml><?xml version="1.0" encoding="utf-8"?>
-<p1510:revInfo xmlns:a="http://schemas.openxmlformats.org/drawingml/2006/main" xmlns:r="http://schemas.openxmlformats.org/officeDocument/2006/relationships" xmlns:p1510="http://schemas.microsoft.com/office/powerpoint/2015/10/main">
-  <p1510:revLst>
-    <p1510:client id="{E8973D15-0A9C-41F9-AF92-3F55EF1A1B67}" v="2498" dt="2022-04-23T20:25:25.374"/>
-  </p1510:revLst>
-</p1510:revInfo>
 </file>
 
 <file path=ppt/changesInfos/changesInfo1.xml><?xml version="1.0" encoding="utf-8"?>
@@ -649,6 +641,30 @@
             <pc:docMk/>
             <pc:sldMk cId="96395411" sldId="311"/>
             <ac:spMk id="4" creationId="{2DE867C4-87D3-4E02-89C1-027122451498}"/>
+          </ac:spMkLst>
+        </pc:spChg>
+      </pc:sldChg>
+    </pc:docChg>
+  </pc:docChgLst>
+  <pc:docChgLst>
+    <pc:chgData name="Scott Corio" userId="dbe1492c70b6d8a8" providerId="LiveId" clId="{E03BF109-786D-4D7A-9437-80725557A688}"/>
+    <pc:docChg chg="modSld">
+      <pc:chgData name="Scott Corio" userId="dbe1492c70b6d8a8" providerId="LiveId" clId="{E03BF109-786D-4D7A-9437-80725557A688}" dt="2022-04-30T10:10:59.900" v="31" actId="20577"/>
+      <pc:docMkLst>
+        <pc:docMk/>
+      </pc:docMkLst>
+      <pc:sldChg chg="modSp mod">
+        <pc:chgData name="Scott Corio" userId="dbe1492c70b6d8a8" providerId="LiveId" clId="{E03BF109-786D-4D7A-9437-80725557A688}" dt="2022-04-30T10:10:59.900" v="31" actId="20577"/>
+        <pc:sldMkLst>
+          <pc:docMk/>
+          <pc:sldMk cId="637967531" sldId="306"/>
+        </pc:sldMkLst>
+        <pc:spChg chg="mod">
+          <ac:chgData name="Scott Corio" userId="dbe1492c70b6d8a8" providerId="LiveId" clId="{E03BF109-786D-4D7A-9437-80725557A688}" dt="2022-04-30T10:10:59.900" v="31" actId="20577"/>
+          <ac:spMkLst>
+            <pc:docMk/>
+            <pc:sldMk cId="637967531" sldId="306"/>
+            <ac:spMk id="3" creationId="{BA7E4968-ECAF-43B6-8959-46B9788A9EFF}"/>
           </ac:spMkLst>
         </pc:spChg>
       </pc:sldChg>
@@ -1287,7 +1303,7 @@
           <a:p>
             <a:fld id="{EC2CC04A-C335-487A-8178-6C90F0F29C95}" type="datetimeFigureOut">
               <a:rPr lang="en-US" smtClean="0"/>
-              <a:t>4/23/2022</a:t>
+              <a:t>4/30/2022</a:t>
             </a:fld>
             <a:endParaRPr lang="en-US"/>
           </a:p>
@@ -8938,8 +8954,21 @@
             </a:r>
             <a:r>
               <a:rPr lang="en-US" dirty="0"/>
-              <a:t> (“$($x)” or “$(Get-Date)”)</a:t>
-            </a:r>
+              <a:t> (“$($x)” or “$(Get-Date)”), -match, -</a:t>
+            </a:r>
+            <a:r>
+              <a:rPr lang="en-US" dirty="0" err="1"/>
+              <a:t>notmatch</a:t>
+            </a:r>
+            <a:r>
+              <a:rPr lang="en-US" dirty="0"/>
+              <a:t>, -</a:t>
+            </a:r>
+            <a:r>
+              <a:rPr lang="en-US" dirty="0" err="1"/>
+              <a:t>cmatch</a:t>
+            </a:r>
+            <a:endParaRPr lang="en-US" dirty="0"/>
           </a:p>
           <a:p>
             <a:r>
@@ -21475,15 +21504,6 @@
 </file>
 
 <file path=customXml/item1.xml><?xml version="1.0" encoding="utf-8"?>
-<?mso-contentType ?>
-<FormTemplates xmlns="http://schemas.microsoft.com/sharepoint/v3/contenttype/forms">
-  <Display>DocumentLibraryForm</Display>
-  <Edit>DocumentLibraryForm</Edit>
-  <New>DocumentLibraryForm</New>
-</FormTemplates>
-</file>
-
-<file path=customXml/item2.xml><?xml version="1.0" encoding="utf-8"?>
 <ct:contentTypeSchema xmlns:ct="http://schemas.microsoft.com/office/2006/metadata/contentType" xmlns:ma="http://schemas.microsoft.com/office/2006/metadata/properties/metaAttributes" ct:_="" ma:_="" ma:contentTypeName="Document" ma:contentTypeID="0x010100066787FB9552CF40BFF026EAAC52FBCA" ma:contentTypeVersion="17" ma:contentTypeDescription="Create a new document." ma:contentTypeScope="" ma:versionID="f57547c7fa236cedaa13bdb688235764">
   <xsd:schema xmlns:xsd="http://www.w3.org/2001/XMLSchema" xmlns:xs="http://www.w3.org/2001/XMLSchema" xmlns:p="http://schemas.microsoft.com/office/2006/metadata/properties" xmlns:ns2="0f628621-369a-46c7-83bd-de17ca407533" xmlns:ns3="994c1987-0261-432a-b2ef-a9da39f1b5e2" targetNamespace="http://schemas.microsoft.com/office/2006/metadata/properties" ma:root="true" ma:fieldsID="f282da3479c417e59db983a63c318b4a" ns2:_="" ns3:_="">
     <xsd:import namespace="0f628621-369a-46c7-83bd-de17ca407533"/>
@@ -21728,7 +21748,7 @@
 </ct:contentTypeSchema>
 </file>
 
-<file path=customXml/item3.xml><?xml version="1.0" encoding="utf-8"?>
+<file path=customXml/item2.xml><?xml version="1.0" encoding="utf-8"?>
 <p:properties xmlns:p="http://schemas.microsoft.com/office/2006/metadata/properties" xmlns:xsi="http://www.w3.org/2001/XMLSchema-instance" xmlns:pc="http://schemas.microsoft.com/office/infopath/2007/PartnerControls">
   <documentManagement>
     <lcf76f155ced4ddcb4097134ff3c332f xmlns="994c1987-0261-432a-b2ef-a9da39f1b5e2">
@@ -21739,15 +21759,16 @@
 </p:properties>
 </file>
 
-<file path=customXml/itemProps1.xml><?xml version="1.0" encoding="utf-8"?>
-<ds:datastoreItem xmlns:ds="http://schemas.openxmlformats.org/officeDocument/2006/customXml" ds:itemID="{8F9099B0-B9E3-45A6-848D-7EA25626C078}">
-  <ds:schemaRefs>
-    <ds:schemaRef ds:uri="http://schemas.microsoft.com/sharepoint/v3/contenttype/forms"/>
-  </ds:schemaRefs>
-</ds:datastoreItem>
+<file path=customXml/item3.xml><?xml version="1.0" encoding="utf-8"?>
+<?mso-contentType ?>
+<FormTemplates xmlns="http://schemas.microsoft.com/sharepoint/v3/contenttype/forms">
+  <Display>DocumentLibraryForm</Display>
+  <Edit>DocumentLibraryForm</Edit>
+  <New>DocumentLibraryForm</New>
+</FormTemplates>
 </file>
 
-<file path=customXml/itemProps2.xml><?xml version="1.0" encoding="utf-8"?>
+<file path=customXml/itemProps1.xml><?xml version="1.0" encoding="utf-8"?>
 <ds:datastoreItem xmlns:ds="http://schemas.openxmlformats.org/officeDocument/2006/customXml" ds:itemID="{FD3B911F-1F1C-4595-9C0F-77A813F570F4}">
   <ds:schemaRefs>
     <ds:schemaRef ds:uri="http://schemas.microsoft.com/office/2006/metadata/contentType"/>
@@ -21766,7 +21787,7 @@
 </ds:datastoreItem>
 </file>
 
-<file path=customXml/itemProps3.xml><?xml version="1.0" encoding="utf-8"?>
+<file path=customXml/itemProps2.xml><?xml version="1.0" encoding="utf-8"?>
 <ds:datastoreItem xmlns:ds="http://schemas.openxmlformats.org/officeDocument/2006/customXml" ds:itemID="{AFF96CB3-579C-4369-8AB2-D91B353AC245}">
   <ds:schemaRefs>
     <ds:schemaRef ds:uri="http://schemas.microsoft.com/office/2006/metadata/properties"/>
@@ -21775,4 +21796,12 @@
     <ds:schemaRef ds:uri="0f628621-369a-46c7-83bd-de17ca407533"/>
   </ds:schemaRefs>
 </ds:datastoreItem>
+</file>
+
+<file path=customXml/itemProps3.xml><?xml version="1.0" encoding="utf-8"?>
+<ds:datastoreItem xmlns:ds="http://schemas.openxmlformats.org/officeDocument/2006/customXml" ds:itemID="{8F9099B0-B9E3-45A6-848D-7EA25626C078}">
+  <ds:schemaRefs>
+    <ds:schemaRef ds:uri="http://schemas.microsoft.com/sharepoint/v3/contenttype/forms"/>
+  </ds:schemaRefs>
+</ds:datastoreItem>
 </file>
</xml_diff>